<commit_message>
added Gabriel Ekodo assignment
</commit_message>
<xml_diff>
--- a/NodeJS-Material/JadePug.pptx
+++ b/NodeJS-Material/JadePug.pptx
@@ -114,7 +114,7 @@
   </p:defaultTextStyle>
   <p:extLst>
     <p:ext uri="{EFAFB233-063F-42B5-8137-9DF3F51BA10A}">
-      <p15:sldGuideLst xmlns:p15="http://schemas.microsoft.com/office/powerpoint/2012/main"/>
+      <p15:sldGuideLst xmlns:p15="http://schemas.microsoft.com/office/powerpoint/2012/main" xmlns=""/>
     </p:ext>
   </p:extLst>
 </p:presentation>
@@ -142,7 +142,7 @@
           <p:cNvPr id="10" name="Rectangle 9">
             <a:extLst>
               <a:ext uri="{FF2B5EF4-FFF2-40B4-BE49-F238E27FC236}">
-                <a16:creationId xmlns:a16="http://schemas.microsoft.com/office/drawing/2014/main" id="{39E3965E-AC41-4711-9D10-E25ABB132D86}"/>
+                <a16:creationId xmlns:a16="http://schemas.microsoft.com/office/drawing/2014/main" xmlns="" id="{39E3965E-AC41-4711-9D10-E25ABB132D86}"/>
               </a:ext>
             </a:extLst>
           </p:cNvPr>
@@ -302,7 +302,7 @@
           <p:cNvPr id="9" name="Straight Connector 8">
             <a:extLst>
               <a:ext uri="{FF2B5EF4-FFF2-40B4-BE49-F238E27FC236}">
-                <a16:creationId xmlns:a16="http://schemas.microsoft.com/office/drawing/2014/main" id="{1F5DC8C3-BA5F-4EED-BB9A-A14272BD82A1}"/>
+                <a16:creationId xmlns:a16="http://schemas.microsoft.com/office/drawing/2014/main" xmlns="" id="{1F5DC8C3-BA5F-4EED-BB9A-A14272BD82A1}"/>
               </a:ext>
             </a:extLst>
           </p:cNvPr>
@@ -346,7 +346,7 @@
           <p:cNvPr id="4" name="Date Placeholder 3">
             <a:extLst>
               <a:ext uri="{FF2B5EF4-FFF2-40B4-BE49-F238E27FC236}">
-                <a16:creationId xmlns:a16="http://schemas.microsoft.com/office/drawing/2014/main" id="{9925CCF1-92C0-4AF3-BFAF-4921631915AB}"/>
+                <a16:creationId xmlns:a16="http://schemas.microsoft.com/office/drawing/2014/main" xmlns="" id="{9925CCF1-92C0-4AF3-BFAF-4921631915AB}"/>
               </a:ext>
             </a:extLst>
           </p:cNvPr>
@@ -375,7 +375,7 @@
           <p:cNvPr id="5" name="Footer Placeholder 4">
             <a:extLst>
               <a:ext uri="{FF2B5EF4-FFF2-40B4-BE49-F238E27FC236}">
-                <a16:creationId xmlns:a16="http://schemas.microsoft.com/office/drawing/2014/main" id="{051A78A9-3DFF-4937-A9F2-5D8CF495F367}"/>
+                <a16:creationId xmlns:a16="http://schemas.microsoft.com/office/drawing/2014/main" xmlns="" id="{051A78A9-3DFF-4937-A9F2-5D8CF495F367}"/>
               </a:ext>
             </a:extLst>
           </p:cNvPr>
@@ -400,7 +400,7 @@
           <p:cNvPr id="6" name="Slide Number Placeholder 5">
             <a:extLst>
               <a:ext uri="{FF2B5EF4-FFF2-40B4-BE49-F238E27FC236}">
-                <a16:creationId xmlns:a16="http://schemas.microsoft.com/office/drawing/2014/main" id="{5FAEB271-5CC0-4759-BC6E-8BE53AB227C0}"/>
+                <a16:creationId xmlns:a16="http://schemas.microsoft.com/office/drawing/2014/main" xmlns="" id="{5FAEB271-5CC0-4759-BC6E-8BE53AB227C0}"/>
               </a:ext>
             </a:extLst>
           </p:cNvPr>
@@ -534,7 +534,7 @@
           <p:cNvPr id="7" name="Date Placeholder 6">
             <a:extLst>
               <a:ext uri="{FF2B5EF4-FFF2-40B4-BE49-F238E27FC236}">
-                <a16:creationId xmlns:a16="http://schemas.microsoft.com/office/drawing/2014/main" id="{7D5506EE-1026-4F35-9ACC-BD05BE0F9B36}"/>
+                <a16:creationId xmlns:a16="http://schemas.microsoft.com/office/drawing/2014/main" xmlns="" id="{7D5506EE-1026-4F35-9ACC-BD05BE0F9B36}"/>
               </a:ext>
             </a:extLst>
           </p:cNvPr>
@@ -563,7 +563,7 @@
           <p:cNvPr id="8" name="Footer Placeholder 7">
             <a:extLst>
               <a:ext uri="{FF2B5EF4-FFF2-40B4-BE49-F238E27FC236}">
-                <a16:creationId xmlns:a16="http://schemas.microsoft.com/office/drawing/2014/main" id="{B7696E5F-8D95-4450-AE52-5438E6EDE2BF}"/>
+                <a16:creationId xmlns:a16="http://schemas.microsoft.com/office/drawing/2014/main" xmlns="" id="{B7696E5F-8D95-4450-AE52-5438E6EDE2BF}"/>
               </a:ext>
             </a:extLst>
           </p:cNvPr>
@@ -588,7 +588,7 @@
           <p:cNvPr id="9" name="Slide Number Placeholder 8">
             <a:extLst>
               <a:ext uri="{FF2B5EF4-FFF2-40B4-BE49-F238E27FC236}">
-                <a16:creationId xmlns:a16="http://schemas.microsoft.com/office/drawing/2014/main" id="{999B2253-74CC-409E-BEB0-F8EFCFCB5629}"/>
+                <a16:creationId xmlns:a16="http://schemas.microsoft.com/office/drawing/2014/main" xmlns="" id="{999B2253-74CC-409E-BEB0-F8EFCFCB5629}"/>
               </a:ext>
             </a:extLst>
           </p:cNvPr>
@@ -647,7 +647,7 @@
           <p:cNvPr id="9" name="Rectangle 8">
             <a:extLst>
               <a:ext uri="{FF2B5EF4-FFF2-40B4-BE49-F238E27FC236}">
-                <a16:creationId xmlns:a16="http://schemas.microsoft.com/office/drawing/2014/main" id="{E1B68A5B-D9FA-424B-A4EB-30E7223836B3}"/>
+                <a16:creationId xmlns:a16="http://schemas.microsoft.com/office/drawing/2014/main" xmlns="" id="{E1B68A5B-D9FA-424B-A4EB-30E7223836B3}"/>
               </a:ext>
             </a:extLst>
           </p:cNvPr>
@@ -776,7 +776,7 @@
           <p:cNvPr id="7" name="Date Placeholder 6">
             <a:extLst>
               <a:ext uri="{FF2B5EF4-FFF2-40B4-BE49-F238E27FC236}">
-                <a16:creationId xmlns:a16="http://schemas.microsoft.com/office/drawing/2014/main" id="{AF33D6B0-F070-45C4-A472-19F432BE3932}"/>
+                <a16:creationId xmlns:a16="http://schemas.microsoft.com/office/drawing/2014/main" xmlns="" id="{AF33D6B0-F070-45C4-A472-19F432BE3932}"/>
               </a:ext>
             </a:extLst>
           </p:cNvPr>
@@ -805,7 +805,7 @@
           <p:cNvPr id="8" name="Footer Placeholder 7">
             <a:extLst>
               <a:ext uri="{FF2B5EF4-FFF2-40B4-BE49-F238E27FC236}">
-                <a16:creationId xmlns:a16="http://schemas.microsoft.com/office/drawing/2014/main" id="{9975399F-DAB2-410D-967F-ED17E6F796E7}"/>
+                <a16:creationId xmlns:a16="http://schemas.microsoft.com/office/drawing/2014/main" xmlns="" id="{9975399F-DAB2-410D-967F-ED17E6F796E7}"/>
               </a:ext>
             </a:extLst>
           </p:cNvPr>
@@ -830,7 +830,7 @@
           <p:cNvPr id="10" name="Slide Number Placeholder 9">
             <a:extLst>
               <a:ext uri="{FF2B5EF4-FFF2-40B4-BE49-F238E27FC236}">
-                <a16:creationId xmlns:a16="http://schemas.microsoft.com/office/drawing/2014/main" id="{F762A46F-6BE5-4D12-9412-5CA7672EA8EC}"/>
+                <a16:creationId xmlns:a16="http://schemas.microsoft.com/office/drawing/2014/main" xmlns="" id="{F762A46F-6BE5-4D12-9412-5CA7672EA8EC}"/>
               </a:ext>
             </a:extLst>
           </p:cNvPr>
@@ -964,7 +964,7 @@
           <p:cNvPr id="7" name="Date Placeholder 6">
             <a:extLst>
               <a:ext uri="{FF2B5EF4-FFF2-40B4-BE49-F238E27FC236}">
-                <a16:creationId xmlns:a16="http://schemas.microsoft.com/office/drawing/2014/main" id="{354D8B55-9EA8-4B81-8E84-9B93B0A27559}"/>
+                <a16:creationId xmlns:a16="http://schemas.microsoft.com/office/drawing/2014/main" xmlns="" id="{354D8B55-9EA8-4B81-8E84-9B93B0A27559}"/>
               </a:ext>
             </a:extLst>
           </p:cNvPr>
@@ -993,7 +993,7 @@
           <p:cNvPr id="8" name="Footer Placeholder 7">
             <a:extLst>
               <a:ext uri="{FF2B5EF4-FFF2-40B4-BE49-F238E27FC236}">
-                <a16:creationId xmlns:a16="http://schemas.microsoft.com/office/drawing/2014/main" id="{062CA021-2578-47CB-822C-BDDFF7223B28}"/>
+                <a16:creationId xmlns:a16="http://schemas.microsoft.com/office/drawing/2014/main" xmlns="" id="{062CA021-2578-47CB-822C-BDDFF7223B28}"/>
               </a:ext>
             </a:extLst>
           </p:cNvPr>
@@ -1018,7 +1018,7 @@
           <p:cNvPr id="9" name="Slide Number Placeholder 8">
             <a:extLst>
               <a:ext uri="{FF2B5EF4-FFF2-40B4-BE49-F238E27FC236}">
-                <a16:creationId xmlns:a16="http://schemas.microsoft.com/office/drawing/2014/main" id="{C4AAB51D-4141-4682-9375-DAFD5FB9DD10}"/>
+                <a16:creationId xmlns:a16="http://schemas.microsoft.com/office/drawing/2014/main" xmlns="" id="{C4AAB51D-4141-4682-9375-DAFD5FB9DD10}"/>
               </a:ext>
             </a:extLst>
           </p:cNvPr>
@@ -1085,7 +1085,7 @@
           <p:cNvPr id="10" name="Rectangle 9">
             <a:extLst>
               <a:ext uri="{FF2B5EF4-FFF2-40B4-BE49-F238E27FC236}">
-                <a16:creationId xmlns:a16="http://schemas.microsoft.com/office/drawing/2014/main" id="{A585C21A-8B93-4657-B5DF-7EAEAD3BE127}"/>
+                <a16:creationId xmlns:a16="http://schemas.microsoft.com/office/drawing/2014/main" xmlns="" id="{A585C21A-8B93-4657-B5DF-7EAEAD3BE127}"/>
               </a:ext>
             </a:extLst>
           </p:cNvPr>
@@ -1293,7 +1293,7 @@
           <p:cNvPr id="9" name="Straight Connector 8">
             <a:extLst>
               <a:ext uri="{FF2B5EF4-FFF2-40B4-BE49-F238E27FC236}">
-                <a16:creationId xmlns:a16="http://schemas.microsoft.com/office/drawing/2014/main" id="{459DE2C1-4C52-40A3-8959-27B2C1BEBFF6}"/>
+                <a16:creationId xmlns:a16="http://schemas.microsoft.com/office/drawing/2014/main" xmlns="" id="{459DE2C1-4C52-40A3-8959-27B2C1BEBFF6}"/>
               </a:ext>
             </a:extLst>
           </p:cNvPr>
@@ -1337,7 +1337,7 @@
           <p:cNvPr id="7" name="Date Placeholder 6">
             <a:extLst>
               <a:ext uri="{FF2B5EF4-FFF2-40B4-BE49-F238E27FC236}">
-                <a16:creationId xmlns:a16="http://schemas.microsoft.com/office/drawing/2014/main" id="{AAF2E137-EC28-48F8-9198-1F02539029B6}"/>
+                <a16:creationId xmlns:a16="http://schemas.microsoft.com/office/drawing/2014/main" xmlns="" id="{AAF2E137-EC28-48F8-9198-1F02539029B6}"/>
               </a:ext>
             </a:extLst>
           </p:cNvPr>
@@ -1366,7 +1366,7 @@
           <p:cNvPr id="8" name="Footer Placeholder 7">
             <a:extLst>
               <a:ext uri="{FF2B5EF4-FFF2-40B4-BE49-F238E27FC236}">
-                <a16:creationId xmlns:a16="http://schemas.microsoft.com/office/drawing/2014/main" id="{189422CD-6F62-4DD6-89EF-07A60B42D219}"/>
+                <a16:creationId xmlns:a16="http://schemas.microsoft.com/office/drawing/2014/main" xmlns="" id="{189422CD-6F62-4DD6-89EF-07A60B42D219}"/>
               </a:ext>
             </a:extLst>
           </p:cNvPr>
@@ -1391,7 +1391,7 @@
           <p:cNvPr id="11" name="Slide Number Placeholder 10">
             <a:extLst>
               <a:ext uri="{FF2B5EF4-FFF2-40B4-BE49-F238E27FC236}">
-                <a16:creationId xmlns:a16="http://schemas.microsoft.com/office/drawing/2014/main" id="{69C6AFF8-42B4-4D05-969B-9F5FB3355555}"/>
+                <a16:creationId xmlns:a16="http://schemas.microsoft.com/office/drawing/2014/main" xmlns="" id="{69C6AFF8-42B4-4D05-969B-9F5FB3355555}"/>
               </a:ext>
             </a:extLst>
           </p:cNvPr>
@@ -1592,7 +1592,7 @@
           <p:cNvPr id="2" name="Date Placeholder 1">
             <a:extLst>
               <a:ext uri="{FF2B5EF4-FFF2-40B4-BE49-F238E27FC236}">
-                <a16:creationId xmlns:a16="http://schemas.microsoft.com/office/drawing/2014/main" id="{5782D47D-B0DC-4C40-BCC6-BBBA32584A38}"/>
+                <a16:creationId xmlns:a16="http://schemas.microsoft.com/office/drawing/2014/main" xmlns="" id="{5782D47D-B0DC-4C40-BCC6-BBBA32584A38}"/>
               </a:ext>
             </a:extLst>
           </p:cNvPr>
@@ -1621,7 +1621,7 @@
           <p:cNvPr id="9" name="Footer Placeholder 8">
             <a:extLst>
               <a:ext uri="{FF2B5EF4-FFF2-40B4-BE49-F238E27FC236}">
-                <a16:creationId xmlns:a16="http://schemas.microsoft.com/office/drawing/2014/main" id="{4690D34E-7EBD-44B2-83CA-4C126A18D7EF}"/>
+                <a16:creationId xmlns:a16="http://schemas.microsoft.com/office/drawing/2014/main" xmlns="" id="{4690D34E-7EBD-44B2-83CA-4C126A18D7EF}"/>
               </a:ext>
             </a:extLst>
           </p:cNvPr>
@@ -1646,7 +1646,7 @@
           <p:cNvPr id="10" name="Slide Number Placeholder 9">
             <a:extLst>
               <a:ext uri="{FF2B5EF4-FFF2-40B4-BE49-F238E27FC236}">
-                <a16:creationId xmlns:a16="http://schemas.microsoft.com/office/drawing/2014/main" id="{2AC511A1-9BBD-42DE-92FB-2AF44F8E97A9}"/>
+                <a16:creationId xmlns:a16="http://schemas.microsoft.com/office/drawing/2014/main" xmlns="" id="{2AC511A1-9BBD-42DE-92FB-2AF44F8E97A9}"/>
               </a:ext>
             </a:extLst>
           </p:cNvPr>
@@ -1989,7 +1989,7 @@
           <p:cNvPr id="2" name="Date Placeholder 1">
             <a:extLst>
               <a:ext uri="{FF2B5EF4-FFF2-40B4-BE49-F238E27FC236}">
-                <a16:creationId xmlns:a16="http://schemas.microsoft.com/office/drawing/2014/main" id="{8AF8A515-AA94-45D1-9223-5C2272618D85}"/>
+                <a16:creationId xmlns:a16="http://schemas.microsoft.com/office/drawing/2014/main" xmlns="" id="{8AF8A515-AA94-45D1-9223-5C2272618D85}"/>
               </a:ext>
             </a:extLst>
           </p:cNvPr>
@@ -2018,7 +2018,7 @@
           <p:cNvPr id="11" name="Footer Placeholder 10">
             <a:extLst>
               <a:ext uri="{FF2B5EF4-FFF2-40B4-BE49-F238E27FC236}">
-                <a16:creationId xmlns:a16="http://schemas.microsoft.com/office/drawing/2014/main" id="{D052F5BC-98E0-4D60-AD67-9547738B7DD4}"/>
+                <a16:creationId xmlns:a16="http://schemas.microsoft.com/office/drawing/2014/main" xmlns="" id="{D052F5BC-98E0-4D60-AD67-9547738B7DD4}"/>
               </a:ext>
             </a:extLst>
           </p:cNvPr>
@@ -2043,7 +2043,7 @@
           <p:cNvPr id="12" name="Slide Number Placeholder 11">
             <a:extLst>
               <a:ext uri="{FF2B5EF4-FFF2-40B4-BE49-F238E27FC236}">
-                <a16:creationId xmlns:a16="http://schemas.microsoft.com/office/drawing/2014/main" id="{A38552DC-952E-41EA-AAAF-C2187523C0B0}"/>
+                <a16:creationId xmlns:a16="http://schemas.microsoft.com/office/drawing/2014/main" xmlns="" id="{A38552DC-952E-41EA-AAAF-C2187523C0B0}"/>
               </a:ext>
             </a:extLst>
           </p:cNvPr>
@@ -2125,7 +2125,7 @@
           <p:cNvPr id="6" name="Date Placeholder 5">
             <a:extLst>
               <a:ext uri="{FF2B5EF4-FFF2-40B4-BE49-F238E27FC236}">
-                <a16:creationId xmlns:a16="http://schemas.microsoft.com/office/drawing/2014/main" id="{7392073F-158F-44A3-8913-917AFFC1BC20}"/>
+                <a16:creationId xmlns:a16="http://schemas.microsoft.com/office/drawing/2014/main" xmlns="" id="{7392073F-158F-44A3-8913-917AFFC1BC20}"/>
               </a:ext>
             </a:extLst>
           </p:cNvPr>
@@ -2154,7 +2154,7 @@
           <p:cNvPr id="7" name="Footer Placeholder 6">
             <a:extLst>
               <a:ext uri="{FF2B5EF4-FFF2-40B4-BE49-F238E27FC236}">
-                <a16:creationId xmlns:a16="http://schemas.microsoft.com/office/drawing/2014/main" id="{EED72207-24CA-42B7-A975-2F8E41CBA904}"/>
+                <a16:creationId xmlns:a16="http://schemas.microsoft.com/office/drawing/2014/main" xmlns="" id="{EED72207-24CA-42B7-A975-2F8E41CBA904}"/>
               </a:ext>
             </a:extLst>
           </p:cNvPr>
@@ -2179,7 +2179,7 @@
           <p:cNvPr id="8" name="Slide Number Placeholder 7">
             <a:extLst>
               <a:ext uri="{FF2B5EF4-FFF2-40B4-BE49-F238E27FC236}">
-                <a16:creationId xmlns:a16="http://schemas.microsoft.com/office/drawing/2014/main" id="{D01080F2-251A-4B88-9A62-16F46D724F83}"/>
+                <a16:creationId xmlns:a16="http://schemas.microsoft.com/office/drawing/2014/main" xmlns="" id="{D01080F2-251A-4B88-9A62-16F46D724F83}"/>
               </a:ext>
             </a:extLst>
           </p:cNvPr>
@@ -2238,7 +2238,7 @@
           <p:cNvPr id="10" name="Rectangle 9">
             <a:extLst>
               <a:ext uri="{FF2B5EF4-FFF2-40B4-BE49-F238E27FC236}">
-                <a16:creationId xmlns:a16="http://schemas.microsoft.com/office/drawing/2014/main" id="{A8E9C91B-7EAD-4562-AB0E-DFB9663AECE3}"/>
+                <a16:creationId xmlns:a16="http://schemas.microsoft.com/office/drawing/2014/main" xmlns="" id="{A8E9C91B-7EAD-4562-AB0E-DFB9663AECE3}"/>
               </a:ext>
             </a:extLst>
           </p:cNvPr>
@@ -2282,7 +2282,7 @@
           <p:cNvPr id="2" name="Date Placeholder 1">
             <a:extLst>
               <a:ext uri="{FF2B5EF4-FFF2-40B4-BE49-F238E27FC236}">
-                <a16:creationId xmlns:a16="http://schemas.microsoft.com/office/drawing/2014/main" id="{94E9223F-721F-47BF-9FD5-0F8D12FF0DE1}"/>
+                <a16:creationId xmlns:a16="http://schemas.microsoft.com/office/drawing/2014/main" xmlns="" id="{94E9223F-721F-47BF-9FD5-0F8D12FF0DE1}"/>
               </a:ext>
             </a:extLst>
           </p:cNvPr>
@@ -2311,7 +2311,7 @@
           <p:cNvPr id="3" name="Footer Placeholder 2">
             <a:extLst>
               <a:ext uri="{FF2B5EF4-FFF2-40B4-BE49-F238E27FC236}">
-                <a16:creationId xmlns:a16="http://schemas.microsoft.com/office/drawing/2014/main" id="{05915714-6BBA-4593-8591-4E26F7D58D9F}"/>
+                <a16:creationId xmlns:a16="http://schemas.microsoft.com/office/drawing/2014/main" xmlns="" id="{05915714-6BBA-4593-8591-4E26F7D58D9F}"/>
               </a:ext>
             </a:extLst>
           </p:cNvPr>
@@ -2336,7 +2336,7 @@
           <p:cNvPr id="4" name="Slide Number Placeholder 3">
             <a:extLst>
               <a:ext uri="{FF2B5EF4-FFF2-40B4-BE49-F238E27FC236}">
-                <a16:creationId xmlns:a16="http://schemas.microsoft.com/office/drawing/2014/main" id="{BE06F857-D2E1-44DD-ABDD-EBB739645B67}"/>
+                <a16:creationId xmlns:a16="http://schemas.microsoft.com/office/drawing/2014/main" xmlns="" id="{BE06F857-D2E1-44DD-ABDD-EBB739645B67}"/>
               </a:ext>
             </a:extLst>
           </p:cNvPr>
@@ -2395,7 +2395,7 @@
           <p:cNvPr id="8" name="Rectangle 7">
             <a:extLst>
               <a:ext uri="{FF2B5EF4-FFF2-40B4-BE49-F238E27FC236}">
-                <a16:creationId xmlns:a16="http://schemas.microsoft.com/office/drawing/2014/main" id="{16D90D66-BCB9-4229-A829-628874352AC0}"/>
+                <a16:creationId xmlns:a16="http://schemas.microsoft.com/office/drawing/2014/main" xmlns="" id="{16D90D66-BCB9-4229-A829-628874352AC0}"/>
               </a:ext>
             </a:extLst>
           </p:cNvPr>
@@ -2734,7 +2734,7 @@
           <p:cNvPr id="8" name="Rectangle 7">
             <a:extLst>
               <a:ext uri="{FF2B5EF4-FFF2-40B4-BE49-F238E27FC236}">
-                <a16:creationId xmlns:a16="http://schemas.microsoft.com/office/drawing/2014/main" id="{DA134939-39C0-4522-A125-A13DFDA66490}"/>
+                <a16:creationId xmlns:a16="http://schemas.microsoft.com/office/drawing/2014/main" xmlns="" id="{DA134939-39C0-4522-A125-A13DFDA66490}"/>
               </a:ext>
             </a:extLst>
           </p:cNvPr>
@@ -3073,7 +3073,7 @@
           <p:cNvPr id="7" name="Rectangle 6">
             <a:extLst>
               <a:ext uri="{FF2B5EF4-FFF2-40B4-BE49-F238E27FC236}">
-                <a16:creationId xmlns:a16="http://schemas.microsoft.com/office/drawing/2014/main" id="{416A0E3C-60E6-4F39-BC55-5F7C224E1F7C}"/>
+                <a16:creationId xmlns:a16="http://schemas.microsoft.com/office/drawing/2014/main" xmlns="" id="{416A0E3C-60E6-4F39-BC55-5F7C224E1F7C}"/>
               </a:ext>
             </a:extLst>
           </p:cNvPr>
@@ -3325,7 +3325,7 @@
           <p:cNvPr id="10" name="Straight Connector 9">
             <a:extLst>
               <a:ext uri="{FF2B5EF4-FFF2-40B4-BE49-F238E27FC236}">
-                <a16:creationId xmlns:a16="http://schemas.microsoft.com/office/drawing/2014/main" id="{C5025DAC-8B93-4160-B017-3A274A5828C0}"/>
+                <a16:creationId xmlns:a16="http://schemas.microsoft.com/office/drawing/2014/main" xmlns="" id="{C5025DAC-8B93-4160-B017-3A274A5828C0}"/>
               </a:ext>
             </a:extLst>
           </p:cNvPr>
@@ -3776,10 +3776,10 @@
           <p:cNvPr id="22" name="Rectangle 21">
             <a:extLst>
               <a:ext uri="{FF2B5EF4-FFF2-40B4-BE49-F238E27FC236}">
-                <a16:creationId xmlns:a16="http://schemas.microsoft.com/office/drawing/2014/main" id="{A9286AD2-18A9-4868-A4E3-7A2097A20810}"/>
+                <a16:creationId xmlns:a16="http://schemas.microsoft.com/office/drawing/2014/main" xmlns="" id="{A9286AD2-18A9-4868-A4E3-7A2097A20810}"/>
               </a:ext>
               <a:ext uri="{C183D7F6-B498-43B3-948B-1728B52AA6E4}">
-                <adec:decorative xmlns:adec="http://schemas.microsoft.com/office/drawing/2017/decorative" val="1"/>
+                <adec:decorative xmlns:adec="http://schemas.microsoft.com/office/drawing/2017/decorative" xmlns="" val="1"/>
               </a:ext>
             </a:extLst>
           </p:cNvPr>
@@ -3789,7 +3789,7 @@
           <p:nvPr>
             <p:extLst>
               <p:ext uri="{386F3935-93C4-4BCD-93E2-E3B085C9AB24}">
-                <p16:designElem xmlns:p16="http://schemas.microsoft.com/office/powerpoint/2015/main" val="1"/>
+                <p16:designElem xmlns:p16="http://schemas.microsoft.com/office/powerpoint/2015/main" xmlns="" val="1"/>
               </p:ext>
             </p:extLst>
           </p:nvPr>
@@ -3836,7 +3836,7 @@
           <p:cNvPr id="2" name="Title 1">
             <a:extLst>
               <a:ext uri="{FF2B5EF4-FFF2-40B4-BE49-F238E27FC236}">
-                <a16:creationId xmlns:a16="http://schemas.microsoft.com/office/drawing/2014/main" id="{78FD68DA-43BA-4508-8DE2-BA9BB7B2FA5B}"/>
+                <a16:creationId xmlns:a16="http://schemas.microsoft.com/office/drawing/2014/main" xmlns="" id="{78FD68DA-43BA-4508-8DE2-BA9BB7B2FA5B}"/>
               </a:ext>
             </a:extLst>
           </p:cNvPr>
@@ -3871,7 +3871,7 @@
           <p:cNvPr id="3" name="Subtitle 2">
             <a:extLst>
               <a:ext uri="{FF2B5EF4-FFF2-40B4-BE49-F238E27FC236}">
-                <a16:creationId xmlns:a16="http://schemas.microsoft.com/office/drawing/2014/main" id="{A8E9CFF2-3777-4FF4-A759-8491175B0B7C}"/>
+                <a16:creationId xmlns:a16="http://schemas.microsoft.com/office/drawing/2014/main" xmlns="" id="{A8E9CFF2-3777-4FF4-A759-8491175B0B7C}"/>
               </a:ext>
             </a:extLst>
           </p:cNvPr>
@@ -3923,7 +3923,7 @@
           <p:cNvPr id="5" name="Picture 4" descr="A picture containing building, sitting, bench, side&#10;&#10;Description automatically generated">
             <a:extLst>
               <a:ext uri="{FF2B5EF4-FFF2-40B4-BE49-F238E27FC236}">
-                <a16:creationId xmlns:a16="http://schemas.microsoft.com/office/drawing/2014/main" id="{282CF6DD-7FE8-4063-9551-1B7BBCE92ABE}"/>
+                <a16:creationId xmlns:a16="http://schemas.microsoft.com/office/drawing/2014/main" xmlns="" id="{282CF6DD-7FE8-4063-9551-1B7BBCE92ABE}"/>
               </a:ext>
             </a:extLst>
           </p:cNvPr>
@@ -3933,7 +3933,7 @@
           <p:nvPr/>
         </p:nvPicPr>
         <p:blipFill rotWithShape="1">
-          <a:blip r:embed="rId2">
+          <a:blip r:embed="rId2" cstate="print">
             <a:extLst>
               <a:ext uri="{28A0092B-C50C-407E-A947-70E740481C1C}">
                 <a14:useLocalDpi xmlns:a14="http://schemas.microsoft.com/office/drawing/2010/main" val="0"/>
@@ -3958,10 +3958,10 @@
           <p:cNvPr id="24" name="Straight Connector 23">
             <a:extLst>
               <a:ext uri="{FF2B5EF4-FFF2-40B4-BE49-F238E27FC236}">
-                <a16:creationId xmlns:a16="http://schemas.microsoft.com/office/drawing/2014/main" id="{E7A7CD63-7EC3-44F3-95D0-595C4019FF24}"/>
+                <a16:creationId xmlns:a16="http://schemas.microsoft.com/office/drawing/2014/main" xmlns="" id="{E7A7CD63-7EC3-44F3-95D0-595C4019FF24}"/>
               </a:ext>
               <a:ext uri="{C183D7F6-B498-43B3-948B-1728B52AA6E4}">
-                <adec:decorative xmlns:adec="http://schemas.microsoft.com/office/drawing/2017/decorative" val="1"/>
+                <adec:decorative xmlns:adec="http://schemas.microsoft.com/office/drawing/2017/decorative" xmlns="" val="1"/>
               </a:ext>
             </a:extLst>
           </p:cNvPr>
@@ -3971,7 +3971,7 @@
           <p:nvPr>
             <p:extLst>
               <p:ext uri="{386F3935-93C4-4BCD-93E2-E3B085C9AB24}">
-                <p16:designElem xmlns:p16="http://schemas.microsoft.com/office/powerpoint/2015/main" val="1"/>
+                <p16:designElem xmlns:p16="http://schemas.microsoft.com/office/powerpoint/2015/main" xmlns="" val="1"/>
               </p:ext>
             </p:extLst>
           </p:nvPr>
@@ -4018,6 +4018,13 @@
   <p:clrMapOvr>
     <a:masterClrMapping/>
   </p:clrMapOvr>
+  <p:timing>
+    <p:tnLst>
+      <p:par>
+        <p:cTn id="1" dur="indefinite" restart="never" nodeType="tmRoot"/>
+      </p:par>
+    </p:tnLst>
+  </p:timing>
 </p:sld>
 </file>
 
@@ -4051,10 +4058,10 @@
           <p:cNvPr id="47" name="Rectangle 46">
             <a:extLst>
               <a:ext uri="{FF2B5EF4-FFF2-40B4-BE49-F238E27FC236}">
-                <a16:creationId xmlns:a16="http://schemas.microsoft.com/office/drawing/2014/main" id="{FBDCECDC-EEE3-4128-AA5E-82A8C08796E8}"/>
+                <a16:creationId xmlns:a16="http://schemas.microsoft.com/office/drawing/2014/main" xmlns="" id="{FBDCECDC-EEE3-4128-AA5E-82A8C08796E8}"/>
               </a:ext>
               <a:ext uri="{C183D7F6-B498-43B3-948B-1728B52AA6E4}">
-                <adec:decorative xmlns:adec="http://schemas.microsoft.com/office/drawing/2017/decorative" val="1"/>
+                <adec:decorative xmlns:adec="http://schemas.microsoft.com/office/drawing/2017/decorative" xmlns="" val="1"/>
               </a:ext>
             </a:extLst>
           </p:cNvPr>
@@ -4064,7 +4071,7 @@
           <p:nvPr>
             <p:extLst>
               <p:ext uri="{386F3935-93C4-4BCD-93E2-E3B085C9AB24}">
-                <p16:designElem xmlns:p16="http://schemas.microsoft.com/office/powerpoint/2015/main" val="1"/>
+                <p16:designElem xmlns:p16="http://schemas.microsoft.com/office/powerpoint/2015/main" xmlns="" val="1"/>
               </p:ext>
             </p:extLst>
           </p:nvPr>
@@ -4114,7 +4121,7 @@
           <p:cNvPr id="2" name="Title 1">
             <a:extLst>
               <a:ext uri="{FF2B5EF4-FFF2-40B4-BE49-F238E27FC236}">
-                <a16:creationId xmlns:a16="http://schemas.microsoft.com/office/drawing/2014/main" id="{9AB2EA78-AEB3-469B-9025-3B17201A457B}"/>
+                <a16:creationId xmlns:a16="http://schemas.microsoft.com/office/drawing/2014/main" xmlns="" id="{9AB2EA78-AEB3-469B-9025-3B17201A457B}"/>
               </a:ext>
             </a:extLst>
           </p:cNvPr>
@@ -4154,10 +4161,10 @@
           <p:cNvPr id="49" name="Rectangle 48">
             <a:extLst>
               <a:ext uri="{FF2B5EF4-FFF2-40B4-BE49-F238E27FC236}">
-                <a16:creationId xmlns:a16="http://schemas.microsoft.com/office/drawing/2014/main" id="{4260EDE0-989C-4E16-AF94-F652294D828E}"/>
+                <a16:creationId xmlns:a16="http://schemas.microsoft.com/office/drawing/2014/main" xmlns="" id="{4260EDE0-989C-4E16-AF94-F652294D828E}"/>
               </a:ext>
               <a:ext uri="{C183D7F6-B498-43B3-948B-1728B52AA6E4}">
-                <adec:decorative xmlns:adec="http://schemas.microsoft.com/office/drawing/2017/decorative" val="1"/>
+                <adec:decorative xmlns:adec="http://schemas.microsoft.com/office/drawing/2017/decorative" xmlns="" val="1"/>
               </a:ext>
             </a:extLst>
           </p:cNvPr>
@@ -4167,7 +4174,7 @@
           <p:nvPr>
             <p:extLst>
               <p:ext uri="{386F3935-93C4-4BCD-93E2-E3B085C9AB24}">
-                <p16:designElem xmlns:p16="http://schemas.microsoft.com/office/powerpoint/2015/main" val="1"/>
+                <p16:designElem xmlns:p16="http://schemas.microsoft.com/office/powerpoint/2015/main" xmlns="" val="1"/>
               </p:ext>
             </p:extLst>
           </p:nvPr>
@@ -4209,7 +4216,7 @@
           <p:cNvPr id="3" name="Subtitle 2">
             <a:extLst>
               <a:ext uri="{FF2B5EF4-FFF2-40B4-BE49-F238E27FC236}">
-                <a16:creationId xmlns:a16="http://schemas.microsoft.com/office/drawing/2014/main" id="{255E1F2F-E259-4EA8-9FFD-3A10AF541859}"/>
+                <a16:creationId xmlns:a16="http://schemas.microsoft.com/office/drawing/2014/main" xmlns="" id="{255E1F2F-E259-4EA8-9FFD-3A10AF541859}"/>
               </a:ext>
             </a:extLst>
           </p:cNvPr>
@@ -4253,6 +4260,13 @@
   <p:clrMapOvr>
     <a:masterClrMapping/>
   </p:clrMapOvr>
+  <p:timing>
+    <p:tnLst>
+      <p:par>
+        <p:cTn id="1" dur="indefinite" restart="never" nodeType="tmRoot"/>
+      </p:par>
+    </p:tnLst>
+  </p:timing>
 </p:sld>
 </file>
 
@@ -4278,7 +4292,7 @@
           <p:cNvPr id="2" name="Title 1">
             <a:extLst>
               <a:ext uri="{FF2B5EF4-FFF2-40B4-BE49-F238E27FC236}">
-                <a16:creationId xmlns:a16="http://schemas.microsoft.com/office/drawing/2014/main" id="{93208B16-B261-C618-3FE5-B42D34869805}"/>
+                <a16:creationId xmlns:a16="http://schemas.microsoft.com/office/drawing/2014/main" xmlns="" id="{93208B16-B261-C618-3FE5-B42D34869805}"/>
               </a:ext>
             </a:extLst>
           </p:cNvPr>
@@ -4306,7 +4320,7 @@
           <p:cNvPr id="3" name="Content Placeholder 2">
             <a:extLst>
               <a:ext uri="{FF2B5EF4-FFF2-40B4-BE49-F238E27FC236}">
-                <a16:creationId xmlns:a16="http://schemas.microsoft.com/office/drawing/2014/main" id="{D843BDF6-D8CE-14DE-D63E-D70F6F390814}"/>
+                <a16:creationId xmlns:a16="http://schemas.microsoft.com/office/drawing/2014/main" xmlns="" id="{D843BDF6-D8CE-14DE-D63E-D70F6F390814}"/>
               </a:ext>
             </a:extLst>
           </p:cNvPr>
@@ -4388,6 +4402,13 @@
   <p:clrMapOvr>
     <a:masterClrMapping/>
   </p:clrMapOvr>
+  <p:timing>
+    <p:tnLst>
+      <p:par>
+        <p:cTn id="1" dur="indefinite" restart="never" nodeType="tmRoot"/>
+      </p:par>
+    </p:tnLst>
+  </p:timing>
 </p:sld>
 </file>
 
@@ -4413,7 +4434,7 @@
           <p:cNvPr id="2" name="Title 1">
             <a:extLst>
               <a:ext uri="{FF2B5EF4-FFF2-40B4-BE49-F238E27FC236}">
-                <a16:creationId xmlns:a16="http://schemas.microsoft.com/office/drawing/2014/main" id="{5E1767E1-F562-3096-42A1-75AFE031B81C}"/>
+                <a16:creationId xmlns:a16="http://schemas.microsoft.com/office/drawing/2014/main" xmlns="" id="{5E1767E1-F562-3096-42A1-75AFE031B81C}"/>
               </a:ext>
             </a:extLst>
           </p:cNvPr>
@@ -4441,7 +4462,7 @@
           <p:cNvPr id="3" name="Content Placeholder 2">
             <a:extLst>
               <a:ext uri="{FF2B5EF4-FFF2-40B4-BE49-F238E27FC236}">
-                <a16:creationId xmlns:a16="http://schemas.microsoft.com/office/drawing/2014/main" id="{B61AA429-6BAC-E7F4-3C1F-5713503FC6BA}"/>
+                <a16:creationId xmlns:a16="http://schemas.microsoft.com/office/drawing/2014/main" xmlns="" id="{B61AA429-6BAC-E7F4-3C1F-5713503FC6BA}"/>
               </a:ext>
             </a:extLst>
           </p:cNvPr>
@@ -4490,7 +4511,7 @@
           <p:cNvPr id="8" name="Picture 7">
             <a:extLst>
               <a:ext uri="{FF2B5EF4-FFF2-40B4-BE49-F238E27FC236}">
-                <a16:creationId xmlns:a16="http://schemas.microsoft.com/office/drawing/2014/main" id="{F4D1EF81-A9BC-8AEB-3F0D-1482B3E673E3}"/>
+                <a16:creationId xmlns:a16="http://schemas.microsoft.com/office/drawing/2014/main" xmlns="" id="{F4D1EF81-A9BC-8AEB-3F0D-1482B3E673E3}"/>
               </a:ext>
             </a:extLst>
           </p:cNvPr>
@@ -4525,6 +4546,13 @@
   <p:clrMapOvr>
     <a:masterClrMapping/>
   </p:clrMapOvr>
+  <p:timing>
+    <p:tnLst>
+      <p:par>
+        <p:cTn id="1" dur="indefinite" restart="never" nodeType="tmRoot"/>
+      </p:par>
+    </p:tnLst>
+  </p:timing>
 </p:sld>
 </file>
 
@@ -4550,7 +4578,7 @@
           <p:cNvPr id="2" name="Title 1">
             <a:extLst>
               <a:ext uri="{FF2B5EF4-FFF2-40B4-BE49-F238E27FC236}">
-                <a16:creationId xmlns:a16="http://schemas.microsoft.com/office/drawing/2014/main" id="{CAC9F4F1-49E8-C609-BDFF-D7B5A47D81D0}"/>
+                <a16:creationId xmlns:a16="http://schemas.microsoft.com/office/drawing/2014/main" xmlns="" id="{CAC9F4F1-49E8-C609-BDFF-D7B5A47D81D0}"/>
               </a:ext>
             </a:extLst>
           </p:cNvPr>
@@ -4578,7 +4606,7 @@
           <p:cNvPr id="5" name="Content Placeholder 4">
             <a:extLst>
               <a:ext uri="{FF2B5EF4-FFF2-40B4-BE49-F238E27FC236}">
-                <a16:creationId xmlns:a16="http://schemas.microsoft.com/office/drawing/2014/main" id="{E63FCD52-32A7-0F94-87BA-BAAF88A4E2C5}"/>
+                <a16:creationId xmlns:a16="http://schemas.microsoft.com/office/drawing/2014/main" xmlns="" id="{E63FCD52-32A7-0F94-87BA-BAAF88A4E2C5}"/>
               </a:ext>
             </a:extLst>
           </p:cNvPr>
@@ -4612,6 +4640,13 @@
   <p:clrMapOvr>
     <a:masterClrMapping/>
   </p:clrMapOvr>
+  <p:timing>
+    <p:tnLst>
+      <p:par>
+        <p:cTn id="1" dur="indefinite" restart="never" nodeType="tmRoot"/>
+      </p:par>
+    </p:tnLst>
+  </p:timing>
 </p:sld>
 </file>
 
@@ -4637,7 +4672,7 @@
           <p:cNvPr id="2" name="Title 1">
             <a:extLst>
               <a:ext uri="{FF2B5EF4-FFF2-40B4-BE49-F238E27FC236}">
-                <a16:creationId xmlns:a16="http://schemas.microsoft.com/office/drawing/2014/main" id="{5BF82910-A5BE-5A6E-7A67-704F20C2572D}"/>
+                <a16:creationId xmlns:a16="http://schemas.microsoft.com/office/drawing/2014/main" xmlns="" id="{5BF82910-A5BE-5A6E-7A67-704F20C2572D}"/>
               </a:ext>
             </a:extLst>
           </p:cNvPr>
@@ -4665,7 +4700,7 @@
           <p:cNvPr id="5" name="Content Placeholder 4">
             <a:extLst>
               <a:ext uri="{FF2B5EF4-FFF2-40B4-BE49-F238E27FC236}">
-                <a16:creationId xmlns:a16="http://schemas.microsoft.com/office/drawing/2014/main" id="{2E6E1BFB-B921-6FE9-E2C3-7CCB1E0D93C9}"/>
+                <a16:creationId xmlns:a16="http://schemas.microsoft.com/office/drawing/2014/main" xmlns="" id="{2E6E1BFB-B921-6FE9-E2C3-7CCB1E0D93C9}"/>
               </a:ext>
             </a:extLst>
           </p:cNvPr>
@@ -4699,6 +4734,13 @@
   <p:clrMapOvr>
     <a:masterClrMapping/>
   </p:clrMapOvr>
+  <p:timing>
+    <p:tnLst>
+      <p:par>
+        <p:cTn id="1" dur="indefinite" restart="never" nodeType="tmRoot"/>
+      </p:par>
+    </p:tnLst>
+  </p:timing>
 </p:sld>
 </file>
 
@@ -4724,7 +4766,7 @@
           <p:cNvPr id="2" name="Title 1">
             <a:extLst>
               <a:ext uri="{FF2B5EF4-FFF2-40B4-BE49-F238E27FC236}">
-                <a16:creationId xmlns:a16="http://schemas.microsoft.com/office/drawing/2014/main" id="{156D1530-1BAC-BE6A-2ED5-263E8147C5EA}"/>
+                <a16:creationId xmlns:a16="http://schemas.microsoft.com/office/drawing/2014/main" xmlns="" id="{156D1530-1BAC-BE6A-2ED5-263E8147C5EA}"/>
               </a:ext>
             </a:extLst>
           </p:cNvPr>
@@ -4740,6 +4782,10 @@
           <a:bodyPr/>
           <a:lstStyle/>
           <a:p>
+            <a:r>
+              <a:rPr lang="en-US" dirty="0"/>
+              <a:t/>
+            </a:r>
             <a:br>
               <a:rPr lang="en-US" dirty="0"/>
             </a:br>
@@ -4755,7 +4801,7 @@
           <p:cNvPr id="6" name="Content Placeholder 5">
             <a:extLst>
               <a:ext uri="{FF2B5EF4-FFF2-40B4-BE49-F238E27FC236}">
-                <a16:creationId xmlns:a16="http://schemas.microsoft.com/office/drawing/2014/main" id="{EF54D717-E998-67EC-E57D-3FD5AD7C02DA}"/>
+                <a16:creationId xmlns:a16="http://schemas.microsoft.com/office/drawing/2014/main" xmlns="" id="{EF54D717-E998-67EC-E57D-3FD5AD7C02DA}"/>
               </a:ext>
             </a:extLst>
           </p:cNvPr>
@@ -4784,7 +4830,7 @@
           <p:cNvPr id="8" name="Picture 7">
             <a:extLst>
               <a:ext uri="{FF2B5EF4-FFF2-40B4-BE49-F238E27FC236}">
-                <a16:creationId xmlns:a16="http://schemas.microsoft.com/office/drawing/2014/main" id="{A02FF222-35F0-2076-8683-92E4F19C84E4}"/>
+                <a16:creationId xmlns:a16="http://schemas.microsoft.com/office/drawing/2014/main" xmlns="" id="{A02FF222-35F0-2076-8683-92E4F19C84E4}"/>
               </a:ext>
             </a:extLst>
           </p:cNvPr>
@@ -4814,7 +4860,7 @@
           <p:cNvPr id="10" name="Picture 9">
             <a:extLst>
               <a:ext uri="{FF2B5EF4-FFF2-40B4-BE49-F238E27FC236}">
-                <a16:creationId xmlns:a16="http://schemas.microsoft.com/office/drawing/2014/main" id="{F9B6E760-267C-8B68-C06C-B45335E24FB7}"/>
+                <a16:creationId xmlns:a16="http://schemas.microsoft.com/office/drawing/2014/main" xmlns="" id="{F9B6E760-267C-8B68-C06C-B45335E24FB7}"/>
               </a:ext>
             </a:extLst>
           </p:cNvPr>
@@ -4849,6 +4895,13 @@
   <p:clrMapOvr>
     <a:masterClrMapping/>
   </p:clrMapOvr>
+  <p:timing>
+    <p:tnLst>
+      <p:par>
+        <p:cTn id="1" dur="indefinite" restart="never" nodeType="tmRoot"/>
+      </p:par>
+    </p:tnLst>
+  </p:timing>
 </p:sld>
 </file>
 
@@ -4874,7 +4927,7 @@
           <p:cNvPr id="2" name="Title 1">
             <a:extLst>
               <a:ext uri="{FF2B5EF4-FFF2-40B4-BE49-F238E27FC236}">
-                <a16:creationId xmlns:a16="http://schemas.microsoft.com/office/drawing/2014/main" id="{8B85B389-3E8B-A6FB-7B59-A672CA6C1A2B}"/>
+                <a16:creationId xmlns:a16="http://schemas.microsoft.com/office/drawing/2014/main" xmlns="" id="{8B85B389-3E8B-A6FB-7B59-A672CA6C1A2B}"/>
               </a:ext>
             </a:extLst>
           </p:cNvPr>
@@ -4902,7 +4955,7 @@
           <p:cNvPr id="5" name="Content Placeholder 4">
             <a:extLst>
               <a:ext uri="{FF2B5EF4-FFF2-40B4-BE49-F238E27FC236}">
-                <a16:creationId xmlns:a16="http://schemas.microsoft.com/office/drawing/2014/main" id="{43203D2F-D092-B005-979F-48AD262F3036}"/>
+                <a16:creationId xmlns:a16="http://schemas.microsoft.com/office/drawing/2014/main" xmlns="" id="{43203D2F-D092-B005-979F-48AD262F3036}"/>
               </a:ext>
             </a:extLst>
           </p:cNvPr>
@@ -4936,6 +4989,13 @@
   <p:clrMapOvr>
     <a:masterClrMapping/>
   </p:clrMapOvr>
+  <p:timing>
+    <p:tnLst>
+      <p:par>
+        <p:cTn id="1" dur="indefinite" restart="never" nodeType="tmRoot"/>
+      </p:par>
+    </p:tnLst>
+  </p:timing>
 </p:sld>
 </file>
 
@@ -4961,7 +5021,7 @@
           <p:cNvPr id="2" name="Title 1">
             <a:extLst>
               <a:ext uri="{FF2B5EF4-FFF2-40B4-BE49-F238E27FC236}">
-                <a16:creationId xmlns:a16="http://schemas.microsoft.com/office/drawing/2014/main" id="{940622A0-8C58-333D-C163-D6CF6D62F23B}"/>
+                <a16:creationId xmlns:a16="http://schemas.microsoft.com/office/drawing/2014/main" xmlns="" id="{940622A0-8C58-333D-C163-D6CF6D62F23B}"/>
               </a:ext>
             </a:extLst>
           </p:cNvPr>
@@ -4989,7 +5049,7 @@
           <p:cNvPr id="5" name="Content Placeholder 4">
             <a:extLst>
               <a:ext uri="{FF2B5EF4-FFF2-40B4-BE49-F238E27FC236}">
-                <a16:creationId xmlns:a16="http://schemas.microsoft.com/office/drawing/2014/main" id="{85192B93-24D6-1ED2-ED8C-D1CCD5E2F27A}"/>
+                <a16:creationId xmlns:a16="http://schemas.microsoft.com/office/drawing/2014/main" xmlns="" id="{85192B93-24D6-1ED2-ED8C-D1CCD5E2F27A}"/>
               </a:ext>
             </a:extLst>
           </p:cNvPr>
@@ -5018,7 +5078,7 @@
           <p:cNvPr id="7" name="Picture 6">
             <a:extLst>
               <a:ext uri="{FF2B5EF4-FFF2-40B4-BE49-F238E27FC236}">
-                <a16:creationId xmlns:a16="http://schemas.microsoft.com/office/drawing/2014/main" id="{7D4844D1-1091-D2BB-871F-FA74DC681174}"/>
+                <a16:creationId xmlns:a16="http://schemas.microsoft.com/office/drawing/2014/main" xmlns="" id="{7D4844D1-1091-D2BB-871F-FA74DC681174}"/>
               </a:ext>
             </a:extLst>
           </p:cNvPr>
@@ -5053,6 +5113,13 @@
   <p:clrMapOvr>
     <a:masterClrMapping/>
   </p:clrMapOvr>
+  <p:timing>
+    <p:tnLst>
+      <p:par>
+        <p:cTn id="1" dur="indefinite" restart="never" nodeType="tmRoot"/>
+      </p:par>
+    </p:tnLst>
+  </p:timing>
 </p:sld>
 </file>
 
@@ -5099,7 +5166,7 @@
     </a:clrScheme>
     <a:fontScheme name="Retrospect">
       <a:majorFont>
-        <a:latin typeface="Bookman Old Style" panose="020F0302020204030204"/>
+        <a:latin typeface="Bookman Old Style"/>
         <a:ea typeface=""/>
         <a:cs typeface=""/>
         <a:font script="Jpan" typeface="ＭＳ Ｐゴシック"/>
@@ -5134,7 +5201,7 @@
         <a:font script="Geor" typeface="Sylfaen"/>
       </a:majorFont>
       <a:minorFont>
-        <a:latin typeface="Franklin Gothic Book" panose="020F0502020204030204"/>
+        <a:latin typeface="Franklin Gothic Book"/>
         <a:ea typeface=""/>
         <a:cs typeface=""/>
         <a:font script="Jpan" typeface="ＭＳ Ｐゴシック"/>
@@ -5333,7 +5400,7 @@
   <a:extraClrSchemeLst/>
   <a:extLst>
     <a:ext uri="{05A4C25C-085E-4340-85A3-A5531E510DB2}">
-      <thm15:themeFamily xmlns:thm15="http://schemas.microsoft.com/office/thememl/2012/main" name="TWO.pptx" id="{769520F8-BFE5-4C8C-A7AA-375C025A91CE}" vid="{AEAFD717-D3C8-4034-8F7E-D5220B0CCEB8}"/>
+      <thm15:themeFamily xmlns:thm15="http://schemas.microsoft.com/office/thememl/2012/main" xmlns="" name="TWO.pptx" id="{769520F8-BFE5-4C8C-A7AA-375C025A91CE}" vid="{AEAFD717-D3C8-4034-8F7E-D5220B0CCEB8}"/>
     </a:ext>
   </a:extLst>
 </a:theme>

</xml_diff>